<commit_message>
update persona.pptx and add Activity Scenario.docx
</commit_message>
<xml_diff>
--- a/phase1/Persona.pptx
+++ b/phase1/Persona.pptx
@@ -3597,7 +3597,83 @@
         </p:nvSpPr>
         <p:spPr>
           <a:xfrm>
-            <a:off x="1879134" y="5524849"/>
+            <a:off x="954395" y="6032280"/>
+            <a:ext cx="1542933" cy="309693"/>
+          </a:xfrm>
+          <a:prstGeom prst="roundRect">
+            <a:avLst/>
+          </a:prstGeom>
+          <a:solidFill>
+            <a:schemeClr val="accent1">
+              <a:lumMod val="60000"/>
+              <a:lumOff val="40000"/>
+            </a:schemeClr>
+          </a:solidFill>
+          <a:ln>
+            <a:noFill/>
+          </a:ln>
+          <a:effectLst>
+            <a:outerShdw blurRad="44450" dist="27940" dir="5400000" algn="ctr">
+              <a:srgbClr val="000000">
+                <a:alpha val="32000"/>
+              </a:srgbClr>
+            </a:outerShdw>
+          </a:effectLst>
+          <a:scene3d>
+            <a:camera prst="orthographicFront">
+              <a:rot lat="0" lon="0" rev="0"/>
+            </a:camera>
+            <a:lightRig rig="balanced" dir="t">
+              <a:rot lat="0" lon="0" rev="8700000"/>
+            </a:lightRig>
+          </a:scene3d>
+          <a:sp3d>
+            <a:bevelT w="190500" h="38100"/>
+          </a:sp3d>
+        </p:spPr>
+        <p:style>
+          <a:lnRef idx="2">
+            <a:schemeClr val="accent1">
+              <a:shade val="50000"/>
+            </a:schemeClr>
+          </a:lnRef>
+          <a:fillRef idx="1">
+            <a:schemeClr val="accent1"/>
+          </a:fillRef>
+          <a:effectRef idx="0">
+            <a:schemeClr val="accent1"/>
+          </a:effectRef>
+          <a:fontRef idx="minor">
+            <a:schemeClr val="lt1"/>
+          </a:fontRef>
+        </p:style>
+        <p:txBody>
+          <a:bodyPr rtlCol="0" anchor="ctr"/>
+          <a:lstStyle/>
+          <a:p>
+            <a:pPr algn="ctr"/>
+            <a:r>
+              <a:rPr lang="pt-PT" dirty="0"/>
+              <a:t>Conquistador</a:t>
+            </a:r>
+          </a:p>
+        </p:txBody>
+      </p:sp>
+      <p:sp>
+        <p:nvSpPr>
+          <p:cNvPr id="9" name="Rectangle: Rounded Corners 8">
+            <a:extLst>
+              <a:ext uri="{FF2B5EF4-FFF2-40B4-BE49-F238E27FC236}">
+                <a16:creationId xmlns:a16="http://schemas.microsoft.com/office/drawing/2014/main" id="{C0FB2A80-FDB6-C658-31F5-A47457A72BCE}"/>
+              </a:ext>
+            </a:extLst>
+          </p:cNvPr>
+          <p:cNvSpPr/>
+          <p:nvPr/>
+        </p:nvSpPr>
+        <p:spPr>
+          <a:xfrm>
+            <a:off x="1862037" y="5524849"/>
             <a:ext cx="1308682" cy="309693"/>
           </a:xfrm>
           <a:prstGeom prst="roundRect">
@@ -3653,8 +3729,849 @@
           <a:p>
             <a:pPr algn="ctr"/>
             <a:r>
-              <a:rPr lang="pt-PT" sz="1500" dirty="0"/>
-              <a:t>Conquistador</a:t>
+              <a:rPr lang="pt-PT" dirty="0"/>
+              <a:t>Persistente</a:t>
+            </a:r>
+          </a:p>
+        </p:txBody>
+      </p:sp>
+      <p:sp>
+        <p:nvSpPr>
+          <p:cNvPr id="11" name="TextBox 10">
+            <a:extLst>
+              <a:ext uri="{FF2B5EF4-FFF2-40B4-BE49-F238E27FC236}">
+                <a16:creationId xmlns:a16="http://schemas.microsoft.com/office/drawing/2014/main" id="{C2397600-B300-9E4B-A472-710D62F08D90}"/>
+              </a:ext>
+            </a:extLst>
+          </p:cNvPr>
+          <p:cNvSpPr txBox="1"/>
+          <p:nvPr/>
+        </p:nvSpPr>
+        <p:spPr>
+          <a:xfrm>
+            <a:off x="219320" y="3813190"/>
+            <a:ext cx="2908269" cy="1569660"/>
+          </a:xfrm>
+          <a:prstGeom prst="rect">
+            <a:avLst/>
+          </a:prstGeom>
+          <a:noFill/>
+        </p:spPr>
+        <p:txBody>
+          <a:bodyPr wrap="square" rtlCol="0">
+            <a:spAutoFit/>
+          </a:bodyPr>
+          <a:lstStyle/>
+          <a:p>
+            <a:r>
+              <a:rPr lang="pt-PT" sz="1200" dirty="0">
+                <a:latin typeface="Arial" panose="020B0604020202020204" pitchFamily="34" charset="0"/>
+                <a:cs typeface="Arial" panose="020B0604020202020204" pitchFamily="34" charset="0"/>
+              </a:rPr>
+              <a:t>Idade: </a:t>
+            </a:r>
+            <a:r>
+              <a:rPr lang="pt-PT" sz="1200" b="1" dirty="0">
+                <a:latin typeface="Arial" panose="020B0604020202020204" pitchFamily="34" charset="0"/>
+                <a:cs typeface="Arial" panose="020B0604020202020204" pitchFamily="34" charset="0"/>
+              </a:rPr>
+              <a:t>23</a:t>
+            </a:r>
+          </a:p>
+          <a:p>
+            <a:r>
+              <a:rPr lang="pt-PT" sz="1200" dirty="0">
+                <a:latin typeface="Arial" panose="020B0604020202020204" pitchFamily="34" charset="0"/>
+                <a:cs typeface="Arial" panose="020B0604020202020204" pitchFamily="34" charset="0"/>
+              </a:rPr>
+              <a:t>Habilitação: </a:t>
+            </a:r>
+            <a:r>
+              <a:rPr lang="pt-PT" sz="1200" b="1" dirty="0">
+                <a:latin typeface="Arial" panose="020B0604020202020204" pitchFamily="34" charset="0"/>
+                <a:cs typeface="Arial" panose="020B0604020202020204" pitchFamily="34" charset="0"/>
+              </a:rPr>
+              <a:t>Secundário</a:t>
+            </a:r>
+          </a:p>
+          <a:p>
+            <a:r>
+              <a:rPr lang="pt-PT" sz="1200" dirty="0">
+                <a:latin typeface="Arial" panose="020B0604020202020204" pitchFamily="34" charset="0"/>
+                <a:cs typeface="Arial" panose="020B0604020202020204" pitchFamily="34" charset="0"/>
+              </a:rPr>
+              <a:t>Trabalho/Ocupação: </a:t>
+            </a:r>
+            <a:r>
+              <a:rPr lang="pt-PT" sz="1200" b="1" dirty="0">
+                <a:latin typeface="Arial" panose="020B0604020202020204" pitchFamily="34" charset="0"/>
+                <a:cs typeface="Arial" panose="020B0604020202020204" pitchFamily="34" charset="0"/>
+              </a:rPr>
+              <a:t>Estudante</a:t>
+            </a:r>
+          </a:p>
+          <a:p>
+            <a:r>
+              <a:rPr lang="pt-PT" sz="1200" dirty="0">
+                <a:latin typeface="Arial" panose="020B0604020202020204" pitchFamily="34" charset="0"/>
+                <a:cs typeface="Arial" panose="020B0604020202020204" pitchFamily="34" charset="0"/>
+              </a:rPr>
+              <a:t>Estado Civil: </a:t>
+            </a:r>
+            <a:r>
+              <a:rPr lang="pt-PT" sz="1200" b="1" dirty="0">
+                <a:latin typeface="Arial" panose="020B0604020202020204" pitchFamily="34" charset="0"/>
+                <a:cs typeface="Arial" panose="020B0604020202020204" pitchFamily="34" charset="0"/>
+              </a:rPr>
+              <a:t>Solteiro</a:t>
+            </a:r>
+          </a:p>
+          <a:p>
+            <a:r>
+              <a:rPr lang="pt-PT" sz="1200" dirty="0">
+                <a:latin typeface="Arial" panose="020B0604020202020204" pitchFamily="34" charset="0"/>
+                <a:cs typeface="Arial" panose="020B0604020202020204" pitchFamily="34" charset="0"/>
+              </a:rPr>
+              <a:t>Localização: </a:t>
+            </a:r>
+            <a:r>
+              <a:rPr lang="pt-PT" sz="1200" b="1" dirty="0">
+                <a:latin typeface="Arial" panose="020B0604020202020204" pitchFamily="34" charset="0"/>
+                <a:cs typeface="Arial" panose="020B0604020202020204" pitchFamily="34" charset="0"/>
+              </a:rPr>
+              <a:t>Ermesinde, Portugal</a:t>
+            </a:r>
+          </a:p>
+          <a:p>
+            <a:r>
+              <a:rPr lang="pt-PT" sz="1200" dirty="0">
+                <a:latin typeface="Arial" panose="020B0604020202020204" pitchFamily="34" charset="0"/>
+                <a:cs typeface="Arial" panose="020B0604020202020204" pitchFamily="34" charset="0"/>
+              </a:rPr>
+              <a:t>Literacia Digital: </a:t>
+            </a:r>
+            <a:r>
+              <a:rPr lang="pt-PT" sz="1200" b="1" dirty="0">
+                <a:latin typeface="Arial" panose="020B0604020202020204" pitchFamily="34" charset="0"/>
+                <a:cs typeface="Arial" panose="020B0604020202020204" pitchFamily="34" charset="0"/>
+              </a:rPr>
+              <a:t>Acima da média</a:t>
+            </a:r>
+          </a:p>
+          <a:p>
+            <a:r>
+              <a:rPr lang="pt-PT" sz="1200" dirty="0">
+                <a:latin typeface="Arial" panose="020B0604020202020204" pitchFamily="34" charset="0"/>
+                <a:cs typeface="Arial" panose="020B0604020202020204" pitchFamily="34" charset="0"/>
+              </a:rPr>
+              <a:t>Dispositivo Preferido: </a:t>
+            </a:r>
+            <a:r>
+              <a:rPr lang="pt-PT" sz="1200" b="1" dirty="0">
+                <a:latin typeface="Arial" panose="020B0604020202020204" pitchFamily="34" charset="0"/>
+                <a:cs typeface="Arial" panose="020B0604020202020204" pitchFamily="34" charset="0"/>
+              </a:rPr>
+              <a:t>Telemóvel </a:t>
+            </a:r>
+          </a:p>
+          <a:p>
+            <a:r>
+              <a:rPr lang="pt-PT" sz="1200" dirty="0">
+                <a:latin typeface="Arial" panose="020B0604020202020204" pitchFamily="34" charset="0"/>
+                <a:cs typeface="Arial" panose="020B0604020202020204" pitchFamily="34" charset="0"/>
+              </a:rPr>
+              <a:t>Arquétipo: </a:t>
+            </a:r>
+            <a:r>
+              <a:rPr lang="pt-PT" sz="1200" b="1" dirty="0">
+                <a:latin typeface="Arial" panose="020B0604020202020204" pitchFamily="34" charset="0"/>
+                <a:cs typeface="Arial" panose="020B0604020202020204" pitchFamily="34" charset="0"/>
+              </a:rPr>
+              <a:t>Explorador </a:t>
+            </a:r>
+          </a:p>
+        </p:txBody>
+      </p:sp>
+      <p:sp>
+        <p:nvSpPr>
+          <p:cNvPr id="12" name="TextBox 11">
+            <a:extLst>
+              <a:ext uri="{FF2B5EF4-FFF2-40B4-BE49-F238E27FC236}">
+                <a16:creationId xmlns:a16="http://schemas.microsoft.com/office/drawing/2014/main" id="{8B684866-3088-646C-69A2-FC430FF11C6E}"/>
+              </a:ext>
+            </a:extLst>
+          </p:cNvPr>
+          <p:cNvSpPr txBox="1"/>
+          <p:nvPr/>
+        </p:nvSpPr>
+        <p:spPr>
+          <a:xfrm>
+            <a:off x="3951853" y="906222"/>
+            <a:ext cx="5821960" cy="400110"/>
+          </a:xfrm>
+          <a:prstGeom prst="rect">
+            <a:avLst/>
+          </a:prstGeom>
+          <a:noFill/>
+        </p:spPr>
+        <p:txBody>
+          <a:bodyPr wrap="square" rtlCol="0">
+            <a:spAutoFit/>
+          </a:bodyPr>
+          <a:lstStyle/>
+          <a:p>
+            <a:r>
+              <a:rPr lang="pt-PT" sz="2000" b="1" dirty="0"/>
+              <a:t>Narrativa/Estilo de Vida/Padrões de comportamento</a:t>
+            </a:r>
+          </a:p>
+        </p:txBody>
+      </p:sp>
+      <p:sp>
+        <p:nvSpPr>
+          <p:cNvPr id="13" name="TextBox 12">
+            <a:extLst>
+              <a:ext uri="{FF2B5EF4-FFF2-40B4-BE49-F238E27FC236}">
+                <a16:creationId xmlns:a16="http://schemas.microsoft.com/office/drawing/2014/main" id="{143F0133-8511-C48A-71FC-714B3766333F}"/>
+              </a:ext>
+            </a:extLst>
+          </p:cNvPr>
+          <p:cNvSpPr txBox="1"/>
+          <p:nvPr/>
+        </p:nvSpPr>
+        <p:spPr>
+          <a:xfrm>
+            <a:off x="3951853" y="2684853"/>
+            <a:ext cx="2591821" cy="369332"/>
+          </a:xfrm>
+          <a:prstGeom prst="rect">
+            <a:avLst/>
+          </a:prstGeom>
+          <a:noFill/>
+        </p:spPr>
+        <p:txBody>
+          <a:bodyPr wrap="square" rtlCol="0">
+            <a:spAutoFit/>
+          </a:bodyPr>
+          <a:lstStyle/>
+          <a:p>
+            <a:r>
+              <a:rPr lang="pt-PT" b="1" dirty="0">
+                <a:solidFill>
+                  <a:schemeClr val="accent6">
+                    <a:lumMod val="75000"/>
+                  </a:schemeClr>
+                </a:solidFill>
+              </a:rPr>
+              <a:t>Objetivos/Necessidades</a:t>
+            </a:r>
+          </a:p>
+        </p:txBody>
+      </p:sp>
+      <p:sp>
+        <p:nvSpPr>
+          <p:cNvPr id="14" name="TextBox 13">
+            <a:extLst>
+              <a:ext uri="{FF2B5EF4-FFF2-40B4-BE49-F238E27FC236}">
+                <a16:creationId xmlns:a16="http://schemas.microsoft.com/office/drawing/2014/main" id="{24B82D9F-0344-C8DA-0FF2-66286EB12F19}"/>
+              </a:ext>
+            </a:extLst>
+          </p:cNvPr>
+          <p:cNvSpPr txBox="1"/>
+          <p:nvPr/>
+        </p:nvSpPr>
+        <p:spPr>
+          <a:xfrm>
+            <a:off x="3942825" y="4437235"/>
+            <a:ext cx="2760760" cy="369332"/>
+          </a:xfrm>
+          <a:prstGeom prst="rect">
+            <a:avLst/>
+          </a:prstGeom>
+          <a:noFill/>
+        </p:spPr>
+        <p:txBody>
+          <a:bodyPr wrap="square" rtlCol="0">
+            <a:spAutoFit/>
+          </a:bodyPr>
+          <a:lstStyle/>
+          <a:p>
+            <a:r>
+              <a:rPr lang="pt-PT" b="1" dirty="0">
+                <a:solidFill>
+                  <a:srgbClr val="C00000"/>
+                </a:solidFill>
+              </a:rPr>
+              <a:t>Frustações</a:t>
+            </a:r>
+          </a:p>
+        </p:txBody>
+      </p:sp>
+      <p:pic>
+        <p:nvPicPr>
+          <p:cNvPr id="60" name="Picture 59" descr="A person holding a parrot&#10;&#10;Description automatically generated with medium confidence">
+            <a:extLst>
+              <a:ext uri="{FF2B5EF4-FFF2-40B4-BE49-F238E27FC236}">
+                <a16:creationId xmlns:a16="http://schemas.microsoft.com/office/drawing/2014/main" id="{F3B74A87-B6D3-9F6F-4BC0-00A1147DD85F}"/>
+              </a:ext>
+            </a:extLst>
+          </p:cNvPr>
+          <p:cNvPicPr>
+            <a:picLocks noChangeAspect="1"/>
+          </p:cNvPicPr>
+          <p:nvPr/>
+        </p:nvPicPr>
+        <p:blipFill rotWithShape="1">
+          <a:blip r:embed="rId2">
+            <a:extLst>
+              <a:ext uri="{28A0092B-C50C-407E-A947-70E740481C1C}">
+                <a14:useLocalDpi xmlns:a14="http://schemas.microsoft.com/office/drawing/2010/main" val="0"/>
+              </a:ext>
+            </a:extLst>
+          </a:blip>
+          <a:srcRect r="2862" b="38050"/>
+          <a:stretch/>
+        </p:blipFill>
+        <p:spPr>
+          <a:xfrm>
+            <a:off x="883643" y="1076350"/>
+            <a:ext cx="1818201" cy="1546080"/>
+          </a:xfrm>
+          <a:prstGeom prst="roundRect">
+            <a:avLst>
+              <a:gd name="adj" fmla="val 8793"/>
+            </a:avLst>
+          </a:prstGeom>
+          <a:ln>
+            <a:noFill/>
+          </a:ln>
+          <a:effectLst/>
+          <a:scene3d>
+            <a:camera prst="orthographicFront"/>
+            <a:lightRig rig="contrasting" dir="t">
+              <a:rot lat="0" lon="0" rev="4200000"/>
+            </a:lightRig>
+          </a:scene3d>
+          <a:sp3d prstMaterial="plastic">
+            <a:contourClr>
+              <a:srgbClr val="969696"/>
+            </a:contourClr>
+          </a:sp3d>
+        </p:spPr>
+      </p:pic>
+      <p:sp>
+        <p:nvSpPr>
+          <p:cNvPr id="69" name="TextBox 68">
+            <a:extLst>
+              <a:ext uri="{FF2B5EF4-FFF2-40B4-BE49-F238E27FC236}">
+                <a16:creationId xmlns:a16="http://schemas.microsoft.com/office/drawing/2014/main" id="{72C6261E-502D-04B7-B2FE-9EDC5D70B82D}"/>
+              </a:ext>
+            </a:extLst>
+          </p:cNvPr>
+          <p:cNvSpPr txBox="1"/>
+          <p:nvPr/>
+        </p:nvSpPr>
+        <p:spPr>
+          <a:xfrm>
+            <a:off x="3951853" y="1335705"/>
+            <a:ext cx="7801997" cy="1323439"/>
+          </a:xfrm>
+          <a:prstGeom prst="rect">
+            <a:avLst/>
+          </a:prstGeom>
+          <a:noFill/>
+        </p:spPr>
+        <p:txBody>
+          <a:bodyPr wrap="square" rtlCol="0">
+            <a:spAutoFit/>
+          </a:bodyPr>
+          <a:lstStyle/>
+          <a:p>
+            <a:pPr algn="just"/>
+            <a:r>
+              <a:rPr lang="pt-PT" sz="1600" dirty="0"/>
+              <a:t>Estudante da FEUP, em LEIC, apreciador de aves raras.</a:t>
+            </a:r>
+          </a:p>
+          <a:p>
+            <a:pPr algn="just"/>
+            <a:r>
+              <a:rPr lang="pt-PT" sz="1600" dirty="0"/>
+              <a:t>Tem um projeto pessoal de criar um site com as suas fotografias de aves e planeia catalogá-las para conquistar corações e dominar as internets. </a:t>
+            </a:r>
+          </a:p>
+          <a:p>
+            <a:pPr algn="just"/>
+            <a:r>
+              <a:rPr lang="pt-PT" sz="1600" dirty="0"/>
+              <a:t>Ele gostaria de organizar uma viagem para obter material para o seu site, mas para isso precisa de bibliografia para encontrar novas espécies.</a:t>
+            </a:r>
+          </a:p>
+        </p:txBody>
+      </p:sp>
+      <p:sp>
+        <p:nvSpPr>
+          <p:cNvPr id="70" name="TextBox 69">
+            <a:extLst>
+              <a:ext uri="{FF2B5EF4-FFF2-40B4-BE49-F238E27FC236}">
+                <a16:creationId xmlns:a16="http://schemas.microsoft.com/office/drawing/2014/main" id="{C444050E-76E0-3935-5016-9DFC6FBCD506}"/>
+              </a:ext>
+            </a:extLst>
+          </p:cNvPr>
+          <p:cNvSpPr txBox="1"/>
+          <p:nvPr/>
+        </p:nvSpPr>
+        <p:spPr>
+          <a:xfrm>
+            <a:off x="3951853" y="3112161"/>
+            <a:ext cx="7801998" cy="1323439"/>
+          </a:xfrm>
+          <a:prstGeom prst="rect">
+            <a:avLst/>
+          </a:prstGeom>
+          <a:noFill/>
+        </p:spPr>
+        <p:txBody>
+          <a:bodyPr wrap="square" rtlCol="0">
+            <a:spAutoFit/>
+          </a:bodyPr>
+          <a:lstStyle/>
+          <a:p>
+            <a:pPr marL="285750" indent="-285750" algn="just">
+              <a:buFont typeface="Arial" panose="020B0604020202020204" pitchFamily="34" charset="0"/>
+              <a:buChar char="•"/>
+            </a:pPr>
+            <a:r>
+              <a:rPr lang="pt-PT" sz="1600" dirty="0"/>
+              <a:t>O Vicente pretende requisitar facilmente um livro com a informação que necessita evitando deslocações desnecessárias à biblioteca da FEUP.</a:t>
+            </a:r>
+          </a:p>
+          <a:p>
+            <a:pPr marL="285750" indent="-285750" algn="just">
+              <a:buFont typeface="Arial" panose="020B0604020202020204" pitchFamily="34" charset="0"/>
+              <a:buChar char="•"/>
+            </a:pPr>
+            <a:r>
+              <a:rPr lang="pt-PT" sz="1600" dirty="0"/>
+              <a:t>Ele está interessado em receber uma recomendação de um livro com base nas suas preferências.</a:t>
+            </a:r>
+          </a:p>
+          <a:p>
+            <a:pPr marL="285750" indent="-285750" algn="just">
+              <a:buFont typeface="Arial" panose="020B0604020202020204" pitchFamily="34" charset="0"/>
+              <a:buChar char="•"/>
+            </a:pPr>
+            <a:r>
+              <a:rPr lang="pt-PT" sz="1600" dirty="0"/>
+              <a:t>Ele gostaria de ver críticas de outras pessoas ao livro e deixar a sua também.</a:t>
+            </a:r>
+          </a:p>
+        </p:txBody>
+      </p:sp>
+      <p:sp>
+        <p:nvSpPr>
+          <p:cNvPr id="71" name="TextBox 70">
+            <a:extLst>
+              <a:ext uri="{FF2B5EF4-FFF2-40B4-BE49-F238E27FC236}">
+                <a16:creationId xmlns:a16="http://schemas.microsoft.com/office/drawing/2014/main" id="{2B9117E1-476D-7292-BEFA-0E53836324D7}"/>
+              </a:ext>
+            </a:extLst>
+          </p:cNvPr>
+          <p:cNvSpPr txBox="1"/>
+          <p:nvPr/>
+        </p:nvSpPr>
+        <p:spPr>
+          <a:xfrm>
+            <a:off x="3951854" y="4770410"/>
+            <a:ext cx="7801994" cy="1569660"/>
+          </a:xfrm>
+          <a:prstGeom prst="rect">
+            <a:avLst/>
+          </a:prstGeom>
+          <a:noFill/>
+        </p:spPr>
+        <p:txBody>
+          <a:bodyPr wrap="square" rtlCol="0">
+            <a:spAutoFit/>
+          </a:bodyPr>
+          <a:lstStyle/>
+          <a:p>
+            <a:pPr marL="285750" indent="-285750" algn="just">
+              <a:buFont typeface="Arial" panose="020B0604020202020204" pitchFamily="34" charset="0"/>
+              <a:buChar char="•"/>
+            </a:pPr>
+            <a:r>
+              <a:rPr lang="pt-PT" sz="1600" dirty="0"/>
+              <a:t>O Vicente tem pouca paciência e considera o site da biblioteca pouco responsivo no seu dispostivo preferido.</a:t>
+            </a:r>
+          </a:p>
+          <a:p>
+            <a:pPr marL="285750" indent="-285750" algn="just">
+              <a:buFont typeface="Arial" panose="020B0604020202020204" pitchFamily="34" charset="0"/>
+              <a:buChar char="•"/>
+            </a:pPr>
+            <a:r>
+              <a:rPr lang="pt-PT" sz="1600" dirty="0"/>
+              <a:t>No caso do livro estar indisponível, o Vicente não sabe quando ele volta sem ter de se dirigir à biblioteca.</a:t>
+            </a:r>
+          </a:p>
+          <a:p>
+            <a:pPr marL="285750" indent="-285750" algn="just">
+              <a:buFont typeface="Arial" panose="020B0604020202020204" pitchFamily="34" charset="0"/>
+              <a:buChar char="•"/>
+            </a:pPr>
+            <a:r>
+              <a:rPr lang="pt-PT" sz="1600" dirty="0"/>
+              <a:t>Ele não sabe que livro escolher por isso gostaria de ter algum</a:t>
+            </a:r>
+            <a:r>
+              <a:rPr lang="pt-PT" sz="1600" i="1" dirty="0"/>
+              <a:t> feedback </a:t>
+            </a:r>
+            <a:r>
+              <a:rPr lang="pt-PT" sz="1600" dirty="0"/>
+              <a:t>sobre os livros que existem.</a:t>
+            </a:r>
+          </a:p>
+        </p:txBody>
+      </p:sp>
+    </p:spTree>
+    <p:extLst>
+      <p:ext uri="{BB962C8B-B14F-4D97-AF65-F5344CB8AC3E}">
+        <p14:creationId xmlns:p14="http://schemas.microsoft.com/office/powerpoint/2010/main" val="1965618569"/>
+      </p:ext>
+    </p:extLst>
+  </p:cSld>
+  <p:clrMapOvr>
+    <a:masterClrMapping/>
+  </p:clrMapOvr>
+</p:sld>
+</file>
+
+<file path=ppt/slides/slide2.xml><?xml version="1.0" encoding="utf-8"?>
+<p:sld xmlns:a="http://schemas.openxmlformats.org/drawingml/2006/main" xmlns:r="http://schemas.openxmlformats.org/officeDocument/2006/relationships" xmlns:p="http://schemas.openxmlformats.org/presentationml/2006/main">
+  <p:cSld>
+    <p:spTree>
+      <p:nvGrpSpPr>
+        <p:cNvPr id="1" name=""/>
+        <p:cNvGrpSpPr/>
+        <p:nvPr/>
+      </p:nvGrpSpPr>
+      <p:grpSpPr>
+        <a:xfrm>
+          <a:off x="0" y="0"/>
+          <a:ext cx="0" cy="0"/>
+          <a:chOff x="0" y="0"/>
+          <a:chExt cx="0" cy="0"/>
+        </a:xfrm>
+      </p:grpSpPr>
+      <p:sp>
+        <p:nvSpPr>
+          <p:cNvPr id="2" name="Title 1">
+            <a:extLst>
+              <a:ext uri="{FF2B5EF4-FFF2-40B4-BE49-F238E27FC236}">
+                <a16:creationId xmlns:a16="http://schemas.microsoft.com/office/drawing/2014/main" id="{A791A73C-9635-A847-B497-67930F9E7835}"/>
+              </a:ext>
+            </a:extLst>
+          </p:cNvPr>
+          <p:cNvSpPr>
+            <a:spLocks noGrp="1"/>
+          </p:cNvSpPr>
+          <p:nvPr>
+            <p:ph type="title"/>
+          </p:nvPr>
+        </p:nvSpPr>
+        <p:spPr>
+          <a:xfrm>
+            <a:off x="0" y="0"/>
+            <a:ext cx="12192000" cy="805343"/>
+          </a:xfrm>
+          <a:solidFill>
+            <a:schemeClr val="accent1">
+              <a:lumMod val="60000"/>
+              <a:lumOff val="40000"/>
+            </a:schemeClr>
+          </a:solidFill>
+        </p:spPr>
+        <p:txBody>
+          <a:bodyPr/>
+          <a:lstStyle/>
+          <a:p>
+            <a:r>
+              <a:rPr lang="pt-PT" b="1" dirty="0">
+                <a:solidFill>
+                  <a:schemeClr val="bg1">
+                    <a:lumMod val="95000"/>
+                  </a:schemeClr>
+                </a:solidFill>
+                <a:latin typeface="Arial" panose="020B0604020202020204" pitchFamily="34" charset="0"/>
+                <a:cs typeface="Arial" panose="020B0604020202020204" pitchFamily="34" charset="0"/>
+              </a:rPr>
+              <a:t>Bruno Domingues</a:t>
+            </a:r>
+          </a:p>
+        </p:txBody>
+      </p:sp>
+      <p:cxnSp>
+        <p:nvCxnSpPr>
+          <p:cNvPr id="5" name="Straight Connector 4">
+            <a:extLst>
+              <a:ext uri="{FF2B5EF4-FFF2-40B4-BE49-F238E27FC236}">
+                <a16:creationId xmlns:a16="http://schemas.microsoft.com/office/drawing/2014/main" id="{7242F8BE-5F28-81B8-1EF3-4F00D43AEBDB}"/>
+              </a:ext>
+            </a:extLst>
+          </p:cNvPr>
+          <p:cNvCxnSpPr/>
+          <p:nvPr/>
+        </p:nvCxnSpPr>
+        <p:spPr>
+          <a:xfrm>
+            <a:off x="3431097" y="1015068"/>
+            <a:ext cx="0" cy="5469622"/>
+          </a:xfrm>
+          <a:prstGeom prst="line">
+            <a:avLst/>
+          </a:prstGeom>
+        </p:spPr>
+        <p:style>
+          <a:lnRef idx="1">
+            <a:schemeClr val="accent1"/>
+          </a:lnRef>
+          <a:fillRef idx="0">
+            <a:schemeClr val="accent1"/>
+          </a:fillRef>
+          <a:effectRef idx="0">
+            <a:schemeClr val="accent1"/>
+          </a:effectRef>
+          <a:fontRef idx="minor">
+            <a:schemeClr val="tx1"/>
+          </a:fontRef>
+        </p:style>
+      </p:cxnSp>
+      <p:sp>
+        <p:nvSpPr>
+          <p:cNvPr id="6" name="Rectangle: Rounded Corners 5">
+            <a:extLst>
+              <a:ext uri="{FF2B5EF4-FFF2-40B4-BE49-F238E27FC236}">
+                <a16:creationId xmlns:a16="http://schemas.microsoft.com/office/drawing/2014/main" id="{7B237ACD-0C29-EBDA-93BD-F474DA372ADA}"/>
+              </a:ext>
+            </a:extLst>
+          </p:cNvPr>
+          <p:cNvSpPr/>
+          <p:nvPr/>
+        </p:nvSpPr>
+        <p:spPr>
+          <a:xfrm>
+            <a:off x="390091" y="2898478"/>
+            <a:ext cx="2843865" cy="738231"/>
+          </a:xfrm>
+          <a:prstGeom prst="roundRect">
+            <a:avLst/>
+          </a:prstGeom>
+          <a:solidFill>
+            <a:schemeClr val="accent1">
+              <a:lumMod val="60000"/>
+              <a:lumOff val="40000"/>
+            </a:schemeClr>
+          </a:solidFill>
+          <a:ln>
+            <a:noFill/>
+          </a:ln>
+          <a:effectLst>
+            <a:outerShdw blurRad="44450" dist="27940" dir="5400000" algn="ctr">
+              <a:srgbClr val="000000">
+                <a:alpha val="32000"/>
+              </a:srgbClr>
+            </a:outerShdw>
+          </a:effectLst>
+          <a:scene3d>
+            <a:camera prst="orthographicFront">
+              <a:rot lat="0" lon="0" rev="0"/>
+            </a:camera>
+            <a:lightRig rig="balanced" dir="t">
+              <a:rot lat="0" lon="0" rev="8700000"/>
+            </a:lightRig>
+          </a:scene3d>
+          <a:sp3d>
+            <a:bevelT w="190500" h="38100"/>
+          </a:sp3d>
+        </p:spPr>
+        <p:style>
+          <a:lnRef idx="2">
+            <a:schemeClr val="accent1">
+              <a:shade val="50000"/>
+            </a:schemeClr>
+          </a:lnRef>
+          <a:fillRef idx="1">
+            <a:schemeClr val="accent1"/>
+          </a:fillRef>
+          <a:effectRef idx="0">
+            <a:schemeClr val="accent1"/>
+          </a:effectRef>
+          <a:fontRef idx="minor">
+            <a:schemeClr val="lt1"/>
+          </a:fontRef>
+        </p:style>
+        <p:txBody>
+          <a:bodyPr rtlCol="0" anchor="ctr"/>
+          <a:lstStyle/>
+          <a:p>
+            <a:pPr algn="ctr"/>
+            <a:r>
+              <a:rPr lang="pt-PT" b="1" dirty="0"/>
+              <a:t>“Trabalho duro compensa.”</a:t>
+            </a:r>
+          </a:p>
+        </p:txBody>
+      </p:sp>
+      <p:sp>
+        <p:nvSpPr>
+          <p:cNvPr id="7" name="Rectangle: Rounded Corners 6">
+            <a:extLst>
+              <a:ext uri="{FF2B5EF4-FFF2-40B4-BE49-F238E27FC236}">
+                <a16:creationId xmlns:a16="http://schemas.microsoft.com/office/drawing/2014/main" id="{AFE235CA-F97E-08CC-3415-F2C4ED1A9EC3}"/>
+              </a:ext>
+            </a:extLst>
+          </p:cNvPr>
+          <p:cNvSpPr/>
+          <p:nvPr/>
+        </p:nvSpPr>
+        <p:spPr>
+          <a:xfrm>
+            <a:off x="327172" y="5524849"/>
+            <a:ext cx="1308682" cy="309693"/>
+          </a:xfrm>
+          <a:prstGeom prst="roundRect">
+            <a:avLst/>
+          </a:prstGeom>
+          <a:solidFill>
+            <a:schemeClr val="accent1">
+              <a:lumMod val="60000"/>
+              <a:lumOff val="40000"/>
+            </a:schemeClr>
+          </a:solidFill>
+          <a:ln>
+            <a:noFill/>
+          </a:ln>
+          <a:effectLst>
+            <a:outerShdw blurRad="44450" dist="27940" dir="5400000" algn="ctr">
+              <a:srgbClr val="000000">
+                <a:alpha val="32000"/>
+              </a:srgbClr>
+            </a:outerShdw>
+          </a:effectLst>
+          <a:scene3d>
+            <a:camera prst="orthographicFront">
+              <a:rot lat="0" lon="0" rev="0"/>
+            </a:camera>
+            <a:lightRig rig="balanced" dir="t">
+              <a:rot lat="0" lon="0" rev="8700000"/>
+            </a:lightRig>
+          </a:scene3d>
+          <a:sp3d>
+            <a:bevelT w="190500" h="38100"/>
+          </a:sp3d>
+        </p:spPr>
+        <p:style>
+          <a:lnRef idx="2">
+            <a:schemeClr val="accent1">
+              <a:shade val="50000"/>
+            </a:schemeClr>
+          </a:lnRef>
+          <a:fillRef idx="1">
+            <a:schemeClr val="accent1"/>
+          </a:fillRef>
+          <a:effectRef idx="0">
+            <a:schemeClr val="accent1"/>
+          </a:effectRef>
+          <a:fontRef idx="minor">
+            <a:schemeClr val="lt1"/>
+          </a:fontRef>
+        </p:style>
+        <p:txBody>
+          <a:bodyPr rtlCol="0" anchor="ctr"/>
+          <a:lstStyle/>
+          <a:p>
+            <a:pPr algn="ctr"/>
+            <a:r>
+              <a:rPr lang="pt-PT" dirty="0"/>
+              <a:t>Stressado</a:t>
+            </a:r>
+          </a:p>
+        </p:txBody>
+      </p:sp>
+      <p:sp>
+        <p:nvSpPr>
+          <p:cNvPr id="8" name="Rectangle: Rounded Corners 7">
+            <a:extLst>
+              <a:ext uri="{FF2B5EF4-FFF2-40B4-BE49-F238E27FC236}">
+                <a16:creationId xmlns:a16="http://schemas.microsoft.com/office/drawing/2014/main" id="{33738E72-101A-A725-7340-A947073651FD}"/>
+              </a:ext>
+            </a:extLst>
+          </p:cNvPr>
+          <p:cNvSpPr/>
+          <p:nvPr/>
+        </p:nvSpPr>
+        <p:spPr>
+          <a:xfrm>
+            <a:off x="1879133" y="5524849"/>
+            <a:ext cx="1349837" cy="309693"/>
+          </a:xfrm>
+          <a:prstGeom prst="roundRect">
+            <a:avLst/>
+          </a:prstGeom>
+          <a:solidFill>
+            <a:schemeClr val="accent1">
+              <a:lumMod val="60000"/>
+              <a:lumOff val="40000"/>
+            </a:schemeClr>
+          </a:solidFill>
+          <a:ln>
+            <a:noFill/>
+          </a:ln>
+          <a:effectLst>
+            <a:outerShdw blurRad="44450" dist="27940" dir="5400000" algn="ctr">
+              <a:srgbClr val="000000">
+                <a:alpha val="32000"/>
+              </a:srgbClr>
+            </a:outerShdw>
+          </a:effectLst>
+          <a:scene3d>
+            <a:camera prst="orthographicFront">
+              <a:rot lat="0" lon="0" rev="0"/>
+            </a:camera>
+            <a:lightRig rig="balanced" dir="t">
+              <a:rot lat="0" lon="0" rev="8700000"/>
+            </a:lightRig>
+          </a:scene3d>
+          <a:sp3d>
+            <a:bevelT w="190500" h="38100"/>
+          </a:sp3d>
+        </p:spPr>
+        <p:style>
+          <a:lnRef idx="2">
+            <a:schemeClr val="accent1">
+              <a:shade val="50000"/>
+            </a:schemeClr>
+          </a:lnRef>
+          <a:fillRef idx="1">
+            <a:schemeClr val="accent1"/>
+          </a:fillRef>
+          <a:effectRef idx="0">
+            <a:schemeClr val="accent1"/>
+          </a:effectRef>
+          <a:fontRef idx="minor">
+            <a:schemeClr val="lt1"/>
+          </a:fontRef>
+        </p:style>
+        <p:txBody>
+          <a:bodyPr rtlCol="0" anchor="ctr"/>
+          <a:lstStyle/>
+          <a:p>
+            <a:pPr algn="ctr"/>
+            <a:r>
+              <a:rPr lang="pt-PT" dirty="0"/>
+              <a:t>Empenhado</a:t>
             </a:r>
           </a:p>
         </p:txBody>
@@ -3730,7 +4647,7 @@
             <a:pPr algn="ctr"/>
             <a:r>
               <a:rPr lang="pt-PT" dirty="0"/>
-              <a:t>Persistente</a:t>
+              <a:t>Curioso</a:t>
             </a:r>
           </a:p>
         </p:txBody>
@@ -3749,8 +4666,8 @@
         </p:nvSpPr>
         <p:spPr>
           <a:xfrm>
-            <a:off x="327171" y="3813396"/>
-            <a:ext cx="2709645" cy="1569660"/>
+            <a:off x="213919" y="3813396"/>
+            <a:ext cx="3330427" cy="1569660"/>
           </a:xfrm>
           <a:prstGeom prst="rect">
             <a:avLst/>
@@ -3768,7 +4685,14 @@
                 <a:latin typeface="Arial" panose="020B0604020202020204" pitchFamily="34" charset="0"/>
                 <a:cs typeface="Arial" panose="020B0604020202020204" pitchFamily="34" charset="0"/>
               </a:rPr>
-              <a:t>Idade: 23</a:t>
+              <a:t>Idade: </a:t>
+            </a:r>
+            <a:r>
+              <a:rPr lang="pt-PT" sz="1200" b="1" dirty="0">
+                <a:latin typeface="Arial" panose="020B0604020202020204" pitchFamily="34" charset="0"/>
+                <a:cs typeface="Arial" panose="020B0604020202020204" pitchFamily="34" charset="0"/>
+              </a:rPr>
+              <a:t>21</a:t>
             </a:r>
           </a:p>
           <a:p>
@@ -3777,7 +4701,14 @@
                 <a:latin typeface="Arial" panose="020B0604020202020204" pitchFamily="34" charset="0"/>
                 <a:cs typeface="Arial" panose="020B0604020202020204" pitchFamily="34" charset="0"/>
               </a:rPr>
-              <a:t>Habilitação: Secundário</a:t>
+              <a:t>Habilitação: </a:t>
+            </a:r>
+            <a:r>
+              <a:rPr lang="pt-PT" sz="1200" b="1" dirty="0">
+                <a:latin typeface="Arial" panose="020B0604020202020204" pitchFamily="34" charset="0"/>
+                <a:cs typeface="Arial" panose="020B0604020202020204" pitchFamily="34" charset="0"/>
+              </a:rPr>
+              <a:t>Secundário</a:t>
             </a:r>
           </a:p>
           <a:p>
@@ -3786,7 +4717,14 @@
                 <a:latin typeface="Arial" panose="020B0604020202020204" pitchFamily="34" charset="0"/>
                 <a:cs typeface="Arial" panose="020B0604020202020204" pitchFamily="34" charset="0"/>
               </a:rPr>
-              <a:t>Trabalho/Ocupação: Estudante</a:t>
+              <a:t>Trabalho/Ocupação: </a:t>
+            </a:r>
+            <a:r>
+              <a:rPr lang="pt-PT" sz="1200" b="1" dirty="0">
+                <a:latin typeface="Arial" panose="020B0604020202020204" pitchFamily="34" charset="0"/>
+                <a:cs typeface="Arial" panose="020B0604020202020204" pitchFamily="34" charset="0"/>
+              </a:rPr>
+              <a:t>Trabalhador-Estudante</a:t>
             </a:r>
           </a:p>
           <a:p>
@@ -3795,7 +4733,14 @@
                 <a:latin typeface="Arial" panose="020B0604020202020204" pitchFamily="34" charset="0"/>
                 <a:cs typeface="Arial" panose="020B0604020202020204" pitchFamily="34" charset="0"/>
               </a:rPr>
-              <a:t>Estado Civil: Solteiro</a:t>
+              <a:t>Estado Civil: </a:t>
+            </a:r>
+            <a:r>
+              <a:rPr lang="pt-PT" sz="1200" b="1" dirty="0">
+                <a:latin typeface="Arial" panose="020B0604020202020204" pitchFamily="34" charset="0"/>
+                <a:cs typeface="Arial" panose="020B0604020202020204" pitchFamily="34" charset="0"/>
+              </a:rPr>
+              <a:t>Solteiro </a:t>
             </a:r>
           </a:p>
           <a:p>
@@ -3804,7 +4749,14 @@
                 <a:latin typeface="Arial" panose="020B0604020202020204" pitchFamily="34" charset="0"/>
                 <a:cs typeface="Arial" panose="020B0604020202020204" pitchFamily="34" charset="0"/>
               </a:rPr>
-              <a:t>Localização: Ermesinde, Portugal</a:t>
+              <a:t>Localização: </a:t>
+            </a:r>
+            <a:r>
+              <a:rPr lang="pt-PT" sz="1200" b="1" dirty="0">
+                <a:latin typeface="Arial" panose="020B0604020202020204" pitchFamily="34" charset="0"/>
+                <a:cs typeface="Arial" panose="020B0604020202020204" pitchFamily="34" charset="0"/>
+              </a:rPr>
+              <a:t>Espinho, Portugal</a:t>
             </a:r>
           </a:p>
           <a:p>
@@ -3813,7 +4765,14 @@
                 <a:latin typeface="Arial" panose="020B0604020202020204" pitchFamily="34" charset="0"/>
                 <a:cs typeface="Arial" panose="020B0604020202020204" pitchFamily="34" charset="0"/>
               </a:rPr>
-              <a:t>Literacia Digital: Acima da média</a:t>
+              <a:t>Literacia Digital: </a:t>
+            </a:r>
+            <a:r>
+              <a:rPr lang="pt-PT" sz="1200" b="1" dirty="0">
+                <a:latin typeface="Arial" panose="020B0604020202020204" pitchFamily="34" charset="0"/>
+                <a:cs typeface="Arial" panose="020B0604020202020204" pitchFamily="34" charset="0"/>
+              </a:rPr>
+              <a:t>Média</a:t>
             </a:r>
           </a:p>
           <a:p>
@@ -3822,7 +4781,14 @@
                 <a:latin typeface="Arial" panose="020B0604020202020204" pitchFamily="34" charset="0"/>
                 <a:cs typeface="Arial" panose="020B0604020202020204" pitchFamily="34" charset="0"/>
               </a:rPr>
-              <a:t>Dispositivo Preferido: Telemóvel </a:t>
+              <a:t>Dispositivo Preferido: </a:t>
+            </a:r>
+            <a:r>
+              <a:rPr lang="pt-PT" sz="1200" b="1" dirty="0">
+                <a:latin typeface="Arial" panose="020B0604020202020204" pitchFamily="34" charset="0"/>
+                <a:cs typeface="Arial" panose="020B0604020202020204" pitchFamily="34" charset="0"/>
+              </a:rPr>
+              <a:t>Computador </a:t>
             </a:r>
           </a:p>
           <a:p>
@@ -3831,7 +4797,14 @@
                 <a:latin typeface="Arial" panose="020B0604020202020204" pitchFamily="34" charset="0"/>
                 <a:cs typeface="Arial" panose="020B0604020202020204" pitchFamily="34" charset="0"/>
               </a:rPr>
-              <a:t>Arquétipo: Explorador </a:t>
+              <a:t>Arquétipo: </a:t>
+            </a:r>
+            <a:r>
+              <a:rPr lang="pt-PT" sz="1200" b="1" dirty="0">
+                <a:latin typeface="Arial" panose="020B0604020202020204" pitchFamily="34" charset="0"/>
+                <a:cs typeface="Arial" panose="020B0604020202020204" pitchFamily="34" charset="0"/>
+              </a:rPr>
+              <a:t>Pessoa comum</a:t>
             </a:r>
           </a:p>
         </p:txBody>
@@ -3850,7 +4823,7 @@
         </p:nvSpPr>
         <p:spPr>
           <a:xfrm>
-            <a:off x="3951853" y="1076350"/>
+            <a:off x="3951853" y="959387"/>
             <a:ext cx="5821960" cy="400110"/>
           </a:xfrm>
           <a:prstGeom prst="rect">
@@ -3885,8 +4858,8 @@
         </p:nvSpPr>
         <p:spPr>
           <a:xfrm>
-            <a:off x="3951853" y="3494961"/>
-            <a:ext cx="2315357" cy="369332"/>
+            <a:off x="3951853" y="2721994"/>
+            <a:ext cx="2601347" cy="369332"/>
           </a:xfrm>
           <a:prstGeom prst="rect">
             <a:avLst/>
@@ -3907,7 +4880,7 @@
                   </a:schemeClr>
                 </a:solidFill>
               </a:rPr>
-              <a:t>Objetivo/Necessidade</a:t>
+              <a:t>Objetivos/Necessidades</a:t>
             </a:r>
           </a:p>
         </p:txBody>
@@ -3926,8 +4899,8 @@
         </p:nvSpPr>
         <p:spPr>
           <a:xfrm>
-            <a:off x="3942825" y="5054124"/>
-            <a:ext cx="2718034" cy="369332"/>
+            <a:off x="3956493" y="4670824"/>
+            <a:ext cx="1269848" cy="369332"/>
           </a:xfrm>
           <a:prstGeom prst="rect">
             <a:avLst/>
@@ -3951,74 +4924,22 @@
           </a:p>
         </p:txBody>
       </p:sp>
-      <p:pic>
-        <p:nvPicPr>
-          <p:cNvPr id="60" name="Picture 59" descr="A person holding a parrot&#10;&#10;Description automatically generated with medium confidence">
-            <a:extLst>
-              <a:ext uri="{FF2B5EF4-FFF2-40B4-BE49-F238E27FC236}">
-                <a16:creationId xmlns:a16="http://schemas.microsoft.com/office/drawing/2014/main" id="{F3B74A87-B6D3-9F6F-4BC0-00A1147DD85F}"/>
-              </a:ext>
-            </a:extLst>
-          </p:cNvPr>
-          <p:cNvPicPr>
-            <a:picLocks noChangeAspect="1"/>
-          </p:cNvPicPr>
+      <p:sp>
+        <p:nvSpPr>
+          <p:cNvPr id="69" name="TextBox 68">
+            <a:extLst>
+              <a:ext uri="{FF2B5EF4-FFF2-40B4-BE49-F238E27FC236}">
+                <a16:creationId xmlns:a16="http://schemas.microsoft.com/office/drawing/2014/main" id="{72C6261E-502D-04B7-B2FE-9EDC5D70B82D}"/>
+              </a:ext>
+            </a:extLst>
+          </p:cNvPr>
+          <p:cNvSpPr txBox="1"/>
           <p:nvPr/>
-        </p:nvPicPr>
-        <p:blipFill rotWithShape="1">
-          <a:blip r:embed="rId2">
-            <a:extLst>
-              <a:ext uri="{28A0092B-C50C-407E-A947-70E740481C1C}">
-                <a14:useLocalDpi xmlns:a14="http://schemas.microsoft.com/office/drawing/2010/main" val="0"/>
-              </a:ext>
-            </a:extLst>
-          </a:blip>
-          <a:srcRect r="2862" b="38050"/>
-          <a:stretch/>
-        </p:blipFill>
+        </p:nvSpPr>
         <p:spPr>
           <a:xfrm>
-            <a:off x="883643" y="1076350"/>
-            <a:ext cx="1818201" cy="1546080"/>
-          </a:xfrm>
-          <a:prstGeom prst="roundRect">
-            <a:avLst>
-              <a:gd name="adj" fmla="val 8793"/>
-            </a:avLst>
-          </a:prstGeom>
-          <a:ln>
-            <a:noFill/>
-          </a:ln>
-          <a:effectLst/>
-          <a:scene3d>
-            <a:camera prst="orthographicFront"/>
-            <a:lightRig rig="contrasting" dir="t">
-              <a:rot lat="0" lon="0" rev="4200000"/>
-            </a:lightRig>
-          </a:scene3d>
-          <a:sp3d prstMaterial="plastic">
-            <a:contourClr>
-              <a:srgbClr val="969696"/>
-            </a:contourClr>
-          </a:sp3d>
-        </p:spPr>
-      </p:pic>
-      <p:sp>
-        <p:nvSpPr>
-          <p:cNvPr id="69" name="TextBox 68">
-            <a:extLst>
-              <a:ext uri="{FF2B5EF4-FFF2-40B4-BE49-F238E27FC236}">
-                <a16:creationId xmlns:a16="http://schemas.microsoft.com/office/drawing/2014/main" id="{72C6261E-502D-04B7-B2FE-9EDC5D70B82D}"/>
-              </a:ext>
-            </a:extLst>
-          </p:cNvPr>
-          <p:cNvSpPr txBox="1"/>
-          <p:nvPr/>
-        </p:nvSpPr>
-        <p:spPr>
-          <a:xfrm>
-            <a:off x="3951853" y="1429633"/>
-            <a:ext cx="6669247" cy="2031325"/>
+            <a:off x="3981217" y="1366853"/>
+            <a:ext cx="7677380" cy="1323439"/>
           </a:xfrm>
           <a:prstGeom prst="rect">
             <a:avLst/>
@@ -4031,31 +4952,20 @@
           </a:bodyPr>
           <a:lstStyle/>
           <a:p>
-            <a:r>
-              <a:rPr lang="pt-PT" dirty="0"/>
-              <a:t>Estudante da FEUP, em LEIC, apreciador de aves raras.</a:t>
-            </a:r>
-          </a:p>
-          <a:p>
-            <a:r>
-              <a:rPr lang="pt-PT" dirty="0"/>
-              <a:t>Tem um projeto pessoal de criar um site com as suas fotografias de aves e planeia catalogá-las para conquistar corações e dominar as internets. </a:t>
-            </a:r>
-          </a:p>
-          <a:p>
-            <a:r>
-              <a:rPr lang="pt-PT" dirty="0"/>
-              <a:t>Ele gostaria de organizar uma viagem para obter material para o seu site, mas para isso ele precisa de bibliografia para encontrar novas espécies.</a:t>
-            </a:r>
-          </a:p>
-        </p:txBody>
-      </p:sp>
-      <p:sp>
-        <p:nvSpPr>
-          <p:cNvPr id="70" name="TextBox 69">
-            <a:extLst>
-              <a:ext uri="{FF2B5EF4-FFF2-40B4-BE49-F238E27FC236}">
-                <a16:creationId xmlns:a16="http://schemas.microsoft.com/office/drawing/2014/main" id="{C444050E-76E0-3935-5016-9DFC6FBCD506}"/>
+            <a:pPr algn="just"/>
+            <a:r>
+              <a:rPr lang="pt-PT" sz="1600" dirty="0"/>
+              <a:t>Trabalhador-Estudante da FEUP, em LEIC, empenhado mas com bastantes dificuldades a conciliar a vida de estudante com o trabalho. Para ajudar, costuma juntar-se a um grupo de amigos na biblioteca. No entanto, nem sempre encontram um espaço livre para estudarem, por isso, o Bruno e os amigos gostariam de ter uma forma fácil de encontrar e reservar espaços de estudo.</a:t>
+            </a:r>
+          </a:p>
+        </p:txBody>
+      </p:sp>
+      <p:sp>
+        <p:nvSpPr>
+          <p:cNvPr id="71" name="TextBox 70">
+            <a:extLst>
+              <a:ext uri="{FF2B5EF4-FFF2-40B4-BE49-F238E27FC236}">
+                <a16:creationId xmlns:a16="http://schemas.microsoft.com/office/drawing/2014/main" id="{2B9117E1-476D-7292-BEFA-0E53836324D7}"/>
               </a:ext>
             </a:extLst>
           </p:cNvPr>
@@ -4064,8 +4974,8 @@
         </p:nvSpPr>
         <p:spPr>
           <a:xfrm>
-            <a:off x="3951853" y="3864293"/>
-            <a:ext cx="6182686" cy="1200329"/>
+            <a:off x="3998090" y="5040156"/>
+            <a:ext cx="7706742" cy="1323439"/>
           </a:xfrm>
           <a:prstGeom prst="rect">
             <a:avLst/>
@@ -4078,25 +4988,43 @@
           </a:bodyPr>
           <a:lstStyle/>
           <a:p>
-            <a:r>
-              <a:rPr lang="pt-PT" dirty="0"/>
-              <a:t>Saber localização de aves em Portugal para planear uma viagem para fotografa-las para o seu site.</a:t>
-            </a:r>
-          </a:p>
-          <a:p>
-            <a:r>
-              <a:rPr lang="pt-PT" dirty="0"/>
-              <a:t>Para isso recorre à biblioteca da FEUP para requisitar um livro com a informação que necessita.</a:t>
-            </a:r>
-          </a:p>
-        </p:txBody>
-      </p:sp>
-      <p:sp>
-        <p:nvSpPr>
-          <p:cNvPr id="71" name="TextBox 70">
-            <a:extLst>
-              <a:ext uri="{FF2B5EF4-FFF2-40B4-BE49-F238E27FC236}">
-                <a16:creationId xmlns:a16="http://schemas.microsoft.com/office/drawing/2014/main" id="{2B9117E1-476D-7292-BEFA-0E53836324D7}"/>
+            <a:pPr marL="285750" indent="-285750" algn="just">
+              <a:buFont typeface="Arial" panose="020B0604020202020204" pitchFamily="34" charset="0"/>
+              <a:buChar char="•"/>
+            </a:pPr>
+            <a:r>
+              <a:rPr lang="pt-PT" sz="1600" dirty="0"/>
+              <a:t>O Bruno não sabe quando uma sala de estudo se encontra disponível na biblioteca.</a:t>
+            </a:r>
+          </a:p>
+          <a:p>
+            <a:pPr marL="285750" indent="-285750" algn="just">
+              <a:buFont typeface="Arial" panose="020B0604020202020204" pitchFamily="34" charset="0"/>
+              <a:buChar char="•"/>
+            </a:pPr>
+            <a:r>
+              <a:rPr lang="pt-PT" sz="1600" dirty="0"/>
+              <a:t>Ele não está muito familiarizado com o site da biblioteca por isso tem dificuldade em reservar salas de estudo por esse meio.</a:t>
+            </a:r>
+          </a:p>
+          <a:p>
+            <a:pPr marL="285750" indent="-285750" algn="just">
+              <a:buFont typeface="Arial" panose="020B0604020202020204" pitchFamily="34" charset="0"/>
+              <a:buChar char="•"/>
+            </a:pPr>
+            <a:r>
+              <a:rPr lang="pt-PT" sz="1600" dirty="0"/>
+              <a:t>Por vezes os amigos do Bruno não estão disponíveis para o ajudar e ele fica stressado ao estudar sozinho na biblioteca.</a:t>
+            </a:r>
+          </a:p>
+        </p:txBody>
+      </p:sp>
+      <p:sp>
+        <p:nvSpPr>
+          <p:cNvPr id="17" name="TextBox 16">
+            <a:extLst>
+              <a:ext uri="{FF2B5EF4-FFF2-40B4-BE49-F238E27FC236}">
+                <a16:creationId xmlns:a16="http://schemas.microsoft.com/office/drawing/2014/main" id="{4DE46A66-E355-28DA-9133-10834AB116D5}"/>
               </a:ext>
             </a:extLst>
           </p:cNvPr>
@@ -4105,8 +5033,8 @@
         </p:nvSpPr>
         <p:spPr>
           <a:xfrm>
-            <a:off x="3951853" y="5433954"/>
-            <a:ext cx="6610523" cy="369332"/>
+            <a:off x="3998090" y="3074234"/>
+            <a:ext cx="7660508" cy="1569660"/>
           </a:xfrm>
           <a:prstGeom prst="rect">
             <a:avLst/>
@@ -4119,771 +5047,33 @@
           </a:bodyPr>
           <a:lstStyle/>
           <a:p>
-            <a:r>
-              <a:rPr lang="pt-PT" dirty="0"/>
-              <a:t>O site da biblioteca é pouco responsivo no seu dispostivo preferido.</a:t>
-            </a:r>
-          </a:p>
-        </p:txBody>
-      </p:sp>
-    </p:spTree>
-    <p:extLst>
-      <p:ext uri="{BB962C8B-B14F-4D97-AF65-F5344CB8AC3E}">
-        <p14:creationId xmlns:p14="http://schemas.microsoft.com/office/powerpoint/2010/main" val="1965618569"/>
-      </p:ext>
-    </p:extLst>
-  </p:cSld>
-  <p:clrMapOvr>
-    <a:masterClrMapping/>
-  </p:clrMapOvr>
-</p:sld>
-</file>
-
-<file path=ppt/slides/slide2.xml><?xml version="1.0" encoding="utf-8"?>
-<p:sld xmlns:a="http://schemas.openxmlformats.org/drawingml/2006/main" xmlns:r="http://schemas.openxmlformats.org/officeDocument/2006/relationships" xmlns:p="http://schemas.openxmlformats.org/presentationml/2006/main">
-  <p:cSld>
-    <p:spTree>
-      <p:nvGrpSpPr>
-        <p:cNvPr id="1" name=""/>
-        <p:cNvGrpSpPr/>
-        <p:nvPr/>
-      </p:nvGrpSpPr>
-      <p:grpSpPr>
-        <a:xfrm>
-          <a:off x="0" y="0"/>
-          <a:ext cx="0" cy="0"/>
-          <a:chOff x="0" y="0"/>
-          <a:chExt cx="0" cy="0"/>
-        </a:xfrm>
-      </p:grpSpPr>
-      <p:sp>
-        <p:nvSpPr>
-          <p:cNvPr id="2" name="Title 1">
-            <a:extLst>
-              <a:ext uri="{FF2B5EF4-FFF2-40B4-BE49-F238E27FC236}">
-                <a16:creationId xmlns:a16="http://schemas.microsoft.com/office/drawing/2014/main" id="{A791A73C-9635-A847-B497-67930F9E7835}"/>
-              </a:ext>
-            </a:extLst>
-          </p:cNvPr>
-          <p:cNvSpPr>
-            <a:spLocks noGrp="1"/>
-          </p:cNvSpPr>
-          <p:nvPr>
-            <p:ph type="title"/>
-          </p:nvPr>
-        </p:nvSpPr>
-        <p:spPr>
-          <a:xfrm>
-            <a:off x="0" y="0"/>
-            <a:ext cx="12192000" cy="805343"/>
-          </a:xfrm>
-          <a:solidFill>
-            <a:schemeClr val="accent1">
-              <a:lumMod val="60000"/>
-              <a:lumOff val="40000"/>
-            </a:schemeClr>
-          </a:solidFill>
-        </p:spPr>
-        <p:txBody>
-          <a:bodyPr/>
-          <a:lstStyle/>
-          <a:p>
-            <a:r>
-              <a:rPr lang="pt-PT" b="1" dirty="0">
-                <a:solidFill>
-                  <a:schemeClr val="bg1">
-                    <a:lumMod val="95000"/>
-                  </a:schemeClr>
-                </a:solidFill>
-                <a:latin typeface="Arial" panose="020B0604020202020204" pitchFamily="34" charset="0"/>
-                <a:cs typeface="Arial" panose="020B0604020202020204" pitchFamily="34" charset="0"/>
-              </a:rPr>
-              <a:t>Bruno Domingues</a:t>
-            </a:r>
-          </a:p>
-        </p:txBody>
-      </p:sp>
-      <p:cxnSp>
-        <p:nvCxnSpPr>
-          <p:cNvPr id="5" name="Straight Connector 4">
-            <a:extLst>
-              <a:ext uri="{FF2B5EF4-FFF2-40B4-BE49-F238E27FC236}">
-                <a16:creationId xmlns:a16="http://schemas.microsoft.com/office/drawing/2014/main" id="{7242F8BE-5F28-81B8-1EF3-4F00D43AEBDB}"/>
-              </a:ext>
-            </a:extLst>
-          </p:cNvPr>
-          <p:cNvCxnSpPr/>
-          <p:nvPr/>
-        </p:nvCxnSpPr>
-        <p:spPr>
-          <a:xfrm>
-            <a:off x="3431097" y="1015068"/>
-            <a:ext cx="0" cy="5469622"/>
-          </a:xfrm>
-          <a:prstGeom prst="line">
-            <a:avLst/>
-          </a:prstGeom>
-        </p:spPr>
-        <p:style>
-          <a:lnRef idx="1">
-            <a:schemeClr val="accent1"/>
-          </a:lnRef>
-          <a:fillRef idx="0">
-            <a:schemeClr val="accent1"/>
-          </a:fillRef>
-          <a:effectRef idx="0">
-            <a:schemeClr val="accent1"/>
-          </a:effectRef>
-          <a:fontRef idx="minor">
-            <a:schemeClr val="tx1"/>
-          </a:fontRef>
-        </p:style>
-      </p:cxnSp>
-      <p:sp>
-        <p:nvSpPr>
-          <p:cNvPr id="6" name="Rectangle: Rounded Corners 5">
-            <a:extLst>
-              <a:ext uri="{FF2B5EF4-FFF2-40B4-BE49-F238E27FC236}">
-                <a16:creationId xmlns:a16="http://schemas.microsoft.com/office/drawing/2014/main" id="{7B237ACD-0C29-EBDA-93BD-F474DA372ADA}"/>
-              </a:ext>
-            </a:extLst>
-          </p:cNvPr>
-          <p:cNvSpPr/>
-          <p:nvPr/>
-        </p:nvSpPr>
-        <p:spPr>
-          <a:xfrm>
-            <a:off x="390091" y="2898478"/>
-            <a:ext cx="2843865" cy="738231"/>
-          </a:xfrm>
-          <a:prstGeom prst="roundRect">
-            <a:avLst/>
-          </a:prstGeom>
-          <a:solidFill>
-            <a:schemeClr val="accent1">
-              <a:lumMod val="60000"/>
-              <a:lumOff val="40000"/>
-            </a:schemeClr>
-          </a:solidFill>
-          <a:ln>
-            <a:noFill/>
-          </a:ln>
-          <a:effectLst>
-            <a:outerShdw blurRad="44450" dist="27940" dir="5400000" algn="ctr">
-              <a:srgbClr val="000000">
-                <a:alpha val="32000"/>
-              </a:srgbClr>
-            </a:outerShdw>
-          </a:effectLst>
-          <a:scene3d>
-            <a:camera prst="orthographicFront">
-              <a:rot lat="0" lon="0" rev="0"/>
-            </a:camera>
-            <a:lightRig rig="balanced" dir="t">
-              <a:rot lat="0" lon="0" rev="8700000"/>
-            </a:lightRig>
-          </a:scene3d>
-          <a:sp3d>
-            <a:bevelT w="190500" h="38100"/>
-          </a:sp3d>
-        </p:spPr>
-        <p:style>
-          <a:lnRef idx="2">
-            <a:schemeClr val="accent1">
-              <a:shade val="50000"/>
-            </a:schemeClr>
-          </a:lnRef>
-          <a:fillRef idx="1">
-            <a:schemeClr val="accent1"/>
-          </a:fillRef>
-          <a:effectRef idx="0">
-            <a:schemeClr val="accent1"/>
-          </a:effectRef>
-          <a:fontRef idx="minor">
-            <a:schemeClr val="lt1"/>
-          </a:fontRef>
-        </p:style>
-        <p:txBody>
-          <a:bodyPr rtlCol="0" anchor="ctr"/>
-          <a:lstStyle/>
-          <a:p>
-            <a:pPr algn="ctr"/>
-            <a:r>
-              <a:rPr lang="pt-PT" b="1" dirty="0"/>
-              <a:t>“Trabalho duro compensa”</a:t>
-            </a:r>
-          </a:p>
-        </p:txBody>
-      </p:sp>
-      <p:sp>
-        <p:nvSpPr>
-          <p:cNvPr id="7" name="Rectangle: Rounded Corners 6">
-            <a:extLst>
-              <a:ext uri="{FF2B5EF4-FFF2-40B4-BE49-F238E27FC236}">
-                <a16:creationId xmlns:a16="http://schemas.microsoft.com/office/drawing/2014/main" id="{AFE235CA-F97E-08CC-3415-F2C4ED1A9EC3}"/>
-              </a:ext>
-            </a:extLst>
-          </p:cNvPr>
-          <p:cNvSpPr/>
-          <p:nvPr/>
-        </p:nvSpPr>
-        <p:spPr>
-          <a:xfrm>
-            <a:off x="327172" y="5524849"/>
-            <a:ext cx="1308682" cy="309693"/>
-          </a:xfrm>
-          <a:prstGeom prst="roundRect">
-            <a:avLst/>
-          </a:prstGeom>
-          <a:solidFill>
-            <a:schemeClr val="accent1">
-              <a:lumMod val="60000"/>
-              <a:lumOff val="40000"/>
-            </a:schemeClr>
-          </a:solidFill>
-          <a:ln>
-            <a:noFill/>
-          </a:ln>
-          <a:effectLst>
-            <a:outerShdw blurRad="44450" dist="27940" dir="5400000" algn="ctr">
-              <a:srgbClr val="000000">
-                <a:alpha val="32000"/>
-              </a:srgbClr>
-            </a:outerShdw>
-          </a:effectLst>
-          <a:scene3d>
-            <a:camera prst="orthographicFront">
-              <a:rot lat="0" lon="0" rev="0"/>
-            </a:camera>
-            <a:lightRig rig="balanced" dir="t">
-              <a:rot lat="0" lon="0" rev="8700000"/>
-            </a:lightRig>
-          </a:scene3d>
-          <a:sp3d>
-            <a:bevelT w="190500" h="38100"/>
-          </a:sp3d>
-        </p:spPr>
-        <p:style>
-          <a:lnRef idx="2">
-            <a:schemeClr val="accent1">
-              <a:shade val="50000"/>
-            </a:schemeClr>
-          </a:lnRef>
-          <a:fillRef idx="1">
-            <a:schemeClr val="accent1"/>
-          </a:fillRef>
-          <a:effectRef idx="0">
-            <a:schemeClr val="accent1"/>
-          </a:effectRef>
-          <a:fontRef idx="minor">
-            <a:schemeClr val="lt1"/>
-          </a:fontRef>
-        </p:style>
-        <p:txBody>
-          <a:bodyPr rtlCol="0" anchor="ctr"/>
-          <a:lstStyle/>
-          <a:p>
-            <a:pPr algn="ctr"/>
-            <a:r>
-              <a:rPr lang="pt-PT" dirty="0"/>
-              <a:t>Stressado</a:t>
-            </a:r>
-          </a:p>
-        </p:txBody>
-      </p:sp>
-      <p:sp>
-        <p:nvSpPr>
-          <p:cNvPr id="8" name="Rectangle: Rounded Corners 7">
-            <a:extLst>
-              <a:ext uri="{FF2B5EF4-FFF2-40B4-BE49-F238E27FC236}">
-                <a16:creationId xmlns:a16="http://schemas.microsoft.com/office/drawing/2014/main" id="{33738E72-101A-A725-7340-A947073651FD}"/>
-              </a:ext>
-            </a:extLst>
-          </p:cNvPr>
-          <p:cNvSpPr/>
-          <p:nvPr/>
-        </p:nvSpPr>
-        <p:spPr>
-          <a:xfrm>
-            <a:off x="1879134" y="5524849"/>
-            <a:ext cx="1308682" cy="309693"/>
-          </a:xfrm>
-          <a:prstGeom prst="roundRect">
-            <a:avLst/>
-          </a:prstGeom>
-          <a:solidFill>
-            <a:schemeClr val="accent1">
-              <a:lumMod val="60000"/>
-              <a:lumOff val="40000"/>
-            </a:schemeClr>
-          </a:solidFill>
-          <a:ln>
-            <a:noFill/>
-          </a:ln>
-          <a:effectLst>
-            <a:outerShdw blurRad="44450" dist="27940" dir="5400000" algn="ctr">
-              <a:srgbClr val="000000">
-                <a:alpha val="32000"/>
-              </a:srgbClr>
-            </a:outerShdw>
-          </a:effectLst>
-          <a:scene3d>
-            <a:camera prst="orthographicFront">
-              <a:rot lat="0" lon="0" rev="0"/>
-            </a:camera>
-            <a:lightRig rig="balanced" dir="t">
-              <a:rot lat="0" lon="0" rev="8700000"/>
-            </a:lightRig>
-          </a:scene3d>
-          <a:sp3d>
-            <a:bevelT w="190500" h="38100"/>
-          </a:sp3d>
-        </p:spPr>
-        <p:style>
-          <a:lnRef idx="2">
-            <a:schemeClr val="accent1">
-              <a:shade val="50000"/>
-            </a:schemeClr>
-          </a:lnRef>
-          <a:fillRef idx="1">
-            <a:schemeClr val="accent1"/>
-          </a:fillRef>
-          <a:effectRef idx="0">
-            <a:schemeClr val="accent1"/>
-          </a:effectRef>
-          <a:fontRef idx="minor">
-            <a:schemeClr val="lt1"/>
-          </a:fontRef>
-        </p:style>
-        <p:txBody>
-          <a:bodyPr rtlCol="0" anchor="ctr"/>
-          <a:lstStyle/>
-          <a:p>
-            <a:pPr algn="ctr"/>
-            <a:r>
-              <a:rPr lang="pt-PT" sz="1500" dirty="0"/>
-              <a:t>Empenhado</a:t>
-            </a:r>
-          </a:p>
-        </p:txBody>
-      </p:sp>
-      <p:sp>
-        <p:nvSpPr>
-          <p:cNvPr id="9" name="Rectangle: Rounded Corners 8">
-            <a:extLst>
-              <a:ext uri="{FF2B5EF4-FFF2-40B4-BE49-F238E27FC236}">
-                <a16:creationId xmlns:a16="http://schemas.microsoft.com/office/drawing/2014/main" id="{C0FB2A80-FDB6-C658-31F5-A47457A72BCE}"/>
-              </a:ext>
-            </a:extLst>
-          </p:cNvPr>
-          <p:cNvSpPr/>
-          <p:nvPr/>
-        </p:nvSpPr>
-        <p:spPr>
-          <a:xfrm>
-            <a:off x="1027652" y="5976335"/>
-            <a:ext cx="1308682" cy="309693"/>
-          </a:xfrm>
-          <a:prstGeom prst="roundRect">
-            <a:avLst/>
-          </a:prstGeom>
-          <a:solidFill>
-            <a:schemeClr val="accent1">
-              <a:lumMod val="60000"/>
-              <a:lumOff val="40000"/>
-            </a:schemeClr>
-          </a:solidFill>
-          <a:ln>
-            <a:noFill/>
-          </a:ln>
-          <a:effectLst>
-            <a:outerShdw blurRad="44450" dist="27940" dir="5400000" algn="ctr">
-              <a:srgbClr val="000000">
-                <a:alpha val="32000"/>
-              </a:srgbClr>
-            </a:outerShdw>
-          </a:effectLst>
-          <a:scene3d>
-            <a:camera prst="orthographicFront">
-              <a:rot lat="0" lon="0" rev="0"/>
-            </a:camera>
-            <a:lightRig rig="balanced" dir="t">
-              <a:rot lat="0" lon="0" rev="8700000"/>
-            </a:lightRig>
-          </a:scene3d>
-          <a:sp3d>
-            <a:bevelT w="190500" h="38100"/>
-          </a:sp3d>
-        </p:spPr>
-        <p:style>
-          <a:lnRef idx="2">
-            <a:schemeClr val="accent1">
-              <a:shade val="50000"/>
-            </a:schemeClr>
-          </a:lnRef>
-          <a:fillRef idx="1">
-            <a:schemeClr val="accent1"/>
-          </a:fillRef>
-          <a:effectRef idx="0">
-            <a:schemeClr val="accent1"/>
-          </a:effectRef>
-          <a:fontRef idx="minor">
-            <a:schemeClr val="lt1"/>
-          </a:fontRef>
-        </p:style>
-        <p:txBody>
-          <a:bodyPr rtlCol="0" anchor="ctr"/>
-          <a:lstStyle/>
-          <a:p>
-            <a:pPr algn="ctr"/>
-            <a:r>
-              <a:rPr lang="pt-PT" dirty="0"/>
-              <a:t>Curioso</a:t>
-            </a:r>
-          </a:p>
-        </p:txBody>
-      </p:sp>
-      <p:sp>
-        <p:nvSpPr>
-          <p:cNvPr id="11" name="TextBox 10">
-            <a:extLst>
-              <a:ext uri="{FF2B5EF4-FFF2-40B4-BE49-F238E27FC236}">
-                <a16:creationId xmlns:a16="http://schemas.microsoft.com/office/drawing/2014/main" id="{C2397600-B300-9E4B-A472-710D62F08D90}"/>
-              </a:ext>
-            </a:extLst>
-          </p:cNvPr>
-          <p:cNvSpPr txBox="1"/>
-          <p:nvPr/>
-        </p:nvSpPr>
-        <p:spPr>
-          <a:xfrm>
-            <a:off x="327171" y="3813396"/>
-            <a:ext cx="3221371" cy="1569660"/>
-          </a:xfrm>
-          <a:prstGeom prst="rect">
-            <a:avLst/>
-          </a:prstGeom>
-          <a:noFill/>
-        </p:spPr>
-        <p:txBody>
-          <a:bodyPr wrap="square" rtlCol="0">
-            <a:spAutoFit/>
-          </a:bodyPr>
-          <a:lstStyle/>
-          <a:p>
-            <a:r>
-              <a:rPr lang="pt-PT" sz="1200" dirty="0">
-                <a:latin typeface="Arial" panose="020B0604020202020204" pitchFamily="34" charset="0"/>
-                <a:cs typeface="Arial" panose="020B0604020202020204" pitchFamily="34" charset="0"/>
-              </a:rPr>
-              <a:t>Idade: 21</a:t>
-            </a:r>
-          </a:p>
-          <a:p>
-            <a:r>
-              <a:rPr lang="pt-PT" sz="1200" dirty="0">
-                <a:latin typeface="Arial" panose="020B0604020202020204" pitchFamily="34" charset="0"/>
-                <a:cs typeface="Arial" panose="020B0604020202020204" pitchFamily="34" charset="0"/>
-              </a:rPr>
-              <a:t>Habilitação: Secundário</a:t>
-            </a:r>
-          </a:p>
-          <a:p>
-            <a:r>
-              <a:rPr lang="pt-PT" sz="1200" dirty="0">
-                <a:latin typeface="Arial" panose="020B0604020202020204" pitchFamily="34" charset="0"/>
-                <a:cs typeface="Arial" panose="020B0604020202020204" pitchFamily="34" charset="0"/>
-              </a:rPr>
-              <a:t>Trabalho/Ocupação: Trabalhador-Estudante</a:t>
-            </a:r>
-          </a:p>
-          <a:p>
-            <a:r>
-              <a:rPr lang="pt-PT" sz="1200" dirty="0">
-                <a:latin typeface="Arial" panose="020B0604020202020204" pitchFamily="34" charset="0"/>
-                <a:cs typeface="Arial" panose="020B0604020202020204" pitchFamily="34" charset="0"/>
-              </a:rPr>
-              <a:t>Estado Civil: Solteiro </a:t>
-            </a:r>
-          </a:p>
-          <a:p>
-            <a:r>
-              <a:rPr lang="pt-PT" sz="1200" dirty="0">
-                <a:latin typeface="Arial" panose="020B0604020202020204" pitchFamily="34" charset="0"/>
-                <a:cs typeface="Arial" panose="020B0604020202020204" pitchFamily="34" charset="0"/>
-              </a:rPr>
-              <a:t>Localização: Espinho, Portugal</a:t>
-            </a:r>
-          </a:p>
-          <a:p>
-            <a:r>
-              <a:rPr lang="pt-PT" sz="1200" dirty="0">
-                <a:latin typeface="Arial" panose="020B0604020202020204" pitchFamily="34" charset="0"/>
-                <a:cs typeface="Arial" panose="020B0604020202020204" pitchFamily="34" charset="0"/>
-              </a:rPr>
-              <a:t>Literacia Digital: Média</a:t>
-            </a:r>
-          </a:p>
-          <a:p>
-            <a:r>
-              <a:rPr lang="pt-PT" sz="1200" dirty="0">
-                <a:latin typeface="Arial" panose="020B0604020202020204" pitchFamily="34" charset="0"/>
-                <a:cs typeface="Arial" panose="020B0604020202020204" pitchFamily="34" charset="0"/>
-              </a:rPr>
-              <a:t>Dispositivo Preferido: Computador </a:t>
-            </a:r>
-          </a:p>
-          <a:p>
-            <a:r>
-              <a:rPr lang="pt-PT" sz="1200" dirty="0">
-                <a:latin typeface="Arial" panose="020B0604020202020204" pitchFamily="34" charset="0"/>
-                <a:cs typeface="Arial" panose="020B0604020202020204" pitchFamily="34" charset="0"/>
-              </a:rPr>
-              <a:t>Arquétipo: Pessoa comum</a:t>
-            </a:r>
-          </a:p>
-        </p:txBody>
-      </p:sp>
-      <p:sp>
-        <p:nvSpPr>
-          <p:cNvPr id="12" name="TextBox 11">
-            <a:extLst>
-              <a:ext uri="{FF2B5EF4-FFF2-40B4-BE49-F238E27FC236}">
-                <a16:creationId xmlns:a16="http://schemas.microsoft.com/office/drawing/2014/main" id="{8B684866-3088-646C-69A2-FC430FF11C6E}"/>
-              </a:ext>
-            </a:extLst>
-          </p:cNvPr>
-          <p:cNvSpPr txBox="1"/>
-          <p:nvPr/>
-        </p:nvSpPr>
-        <p:spPr>
-          <a:xfrm>
-            <a:off x="3951853" y="1076350"/>
-            <a:ext cx="5821960" cy="400110"/>
-          </a:xfrm>
-          <a:prstGeom prst="rect">
-            <a:avLst/>
-          </a:prstGeom>
-          <a:noFill/>
-        </p:spPr>
-        <p:txBody>
-          <a:bodyPr wrap="square" rtlCol="0">
-            <a:spAutoFit/>
-          </a:bodyPr>
-          <a:lstStyle/>
-          <a:p>
-            <a:r>
-              <a:rPr lang="pt-PT" sz="2000" b="1" dirty="0"/>
-              <a:t>Narrativa/Estilo de Vida/Padrões de comportamento</a:t>
-            </a:r>
-          </a:p>
-        </p:txBody>
-      </p:sp>
-      <p:sp>
-        <p:nvSpPr>
-          <p:cNvPr id="13" name="TextBox 12">
-            <a:extLst>
-              <a:ext uri="{FF2B5EF4-FFF2-40B4-BE49-F238E27FC236}">
-                <a16:creationId xmlns:a16="http://schemas.microsoft.com/office/drawing/2014/main" id="{143F0133-8511-C48A-71FC-714B3766333F}"/>
-              </a:ext>
-            </a:extLst>
-          </p:cNvPr>
-          <p:cNvSpPr txBox="1"/>
-          <p:nvPr/>
-        </p:nvSpPr>
-        <p:spPr>
-          <a:xfrm>
-            <a:off x="3951853" y="3429000"/>
-            <a:ext cx="2315357" cy="369332"/>
-          </a:xfrm>
-          <a:prstGeom prst="rect">
-            <a:avLst/>
-          </a:prstGeom>
-          <a:noFill/>
-        </p:spPr>
-        <p:txBody>
-          <a:bodyPr wrap="square" rtlCol="0">
-            <a:spAutoFit/>
-          </a:bodyPr>
-          <a:lstStyle/>
-          <a:p>
-            <a:r>
-              <a:rPr lang="pt-PT" b="1" dirty="0">
-                <a:solidFill>
-                  <a:schemeClr val="accent6">
-                    <a:lumMod val="75000"/>
-                  </a:schemeClr>
-                </a:solidFill>
-              </a:rPr>
-              <a:t>Objetivo/Necessidade</a:t>
-            </a:r>
-          </a:p>
-        </p:txBody>
-      </p:sp>
-      <p:sp>
-        <p:nvSpPr>
-          <p:cNvPr id="14" name="TextBox 13">
-            <a:extLst>
-              <a:ext uri="{FF2B5EF4-FFF2-40B4-BE49-F238E27FC236}">
-                <a16:creationId xmlns:a16="http://schemas.microsoft.com/office/drawing/2014/main" id="{24B82D9F-0344-C8DA-0FF2-66286EB12F19}"/>
-              </a:ext>
-            </a:extLst>
-          </p:cNvPr>
-          <p:cNvSpPr txBox="1"/>
-          <p:nvPr/>
-        </p:nvSpPr>
-        <p:spPr>
-          <a:xfrm>
-            <a:off x="3985410" y="4641423"/>
-            <a:ext cx="2718034" cy="369332"/>
-          </a:xfrm>
-          <a:prstGeom prst="rect">
-            <a:avLst/>
-          </a:prstGeom>
-          <a:noFill/>
-        </p:spPr>
-        <p:txBody>
-          <a:bodyPr wrap="square" rtlCol="0">
-            <a:spAutoFit/>
-          </a:bodyPr>
-          <a:lstStyle/>
-          <a:p>
-            <a:r>
-              <a:rPr lang="pt-PT" b="1" dirty="0">
-                <a:solidFill>
-                  <a:srgbClr val="C00000"/>
-                </a:solidFill>
-              </a:rPr>
-              <a:t>Frustações</a:t>
-            </a:r>
-          </a:p>
-        </p:txBody>
-      </p:sp>
-      <p:sp>
-        <p:nvSpPr>
-          <p:cNvPr id="69" name="TextBox 68">
-            <a:extLst>
-              <a:ext uri="{FF2B5EF4-FFF2-40B4-BE49-F238E27FC236}">
-                <a16:creationId xmlns:a16="http://schemas.microsoft.com/office/drawing/2014/main" id="{72C6261E-502D-04B7-B2FE-9EDC5D70B82D}"/>
-              </a:ext>
-            </a:extLst>
-          </p:cNvPr>
-          <p:cNvSpPr txBox="1"/>
-          <p:nvPr/>
-        </p:nvSpPr>
-        <p:spPr>
-          <a:xfrm>
-            <a:off x="3981217" y="1364602"/>
-            <a:ext cx="6669247" cy="1754326"/>
-          </a:xfrm>
-          <a:prstGeom prst="rect">
-            <a:avLst/>
-          </a:prstGeom>
-          <a:noFill/>
-        </p:spPr>
-        <p:txBody>
-          <a:bodyPr wrap="square" rtlCol="0">
-            <a:spAutoFit/>
-          </a:bodyPr>
-          <a:lstStyle/>
-          <a:p>
-            <a:r>
-              <a:rPr lang="pt-PT" dirty="0"/>
-              <a:t>Trabalhador-Estudante da FEUP, em LEIC, empenhado mas com bastantes dificuldades a conciliar a vida de estudante com o trabalho.</a:t>
-            </a:r>
-          </a:p>
-          <a:p>
-            <a:r>
-              <a:rPr lang="pt-PT" dirty="0"/>
-              <a:t>Para ajudar, costuma juntar-se a um grupo de amigos na biblioteca.</a:t>
-            </a:r>
-          </a:p>
-          <a:p>
-            <a:r>
-              <a:rPr lang="pt-PT" dirty="0"/>
-              <a:t>No entanto, nem sempre encontram um espaço livre para estudarem.</a:t>
-            </a:r>
-          </a:p>
-          <a:p>
-            <a:r>
-              <a:rPr lang="pt-PT" dirty="0"/>
-              <a:t>Por isso, o Bruno e os amigos gostariam de ter uma forma fácil de encontrar e reservar espaços de estudo.</a:t>
-            </a:r>
-          </a:p>
-        </p:txBody>
-      </p:sp>
-      <p:sp>
-        <p:nvSpPr>
-          <p:cNvPr id="71" name="TextBox 70">
-            <a:extLst>
-              <a:ext uri="{FF2B5EF4-FFF2-40B4-BE49-F238E27FC236}">
-                <a16:creationId xmlns:a16="http://schemas.microsoft.com/office/drawing/2014/main" id="{2B9117E1-476D-7292-BEFA-0E53836324D7}"/>
-              </a:ext>
-            </a:extLst>
-          </p:cNvPr>
-          <p:cNvSpPr txBox="1"/>
-          <p:nvPr/>
-        </p:nvSpPr>
-        <p:spPr>
-          <a:xfrm>
-            <a:off x="4014774" y="5067042"/>
-            <a:ext cx="7071281" cy="646331"/>
-          </a:xfrm>
-          <a:prstGeom prst="rect">
-            <a:avLst/>
-          </a:prstGeom>
-          <a:noFill/>
-        </p:spPr>
-        <p:txBody>
-          <a:bodyPr wrap="square" rtlCol="0">
-            <a:spAutoFit/>
-          </a:bodyPr>
-          <a:lstStyle/>
-          <a:p>
-            <a:r>
-              <a:rPr lang="pt-PT" dirty="0"/>
-              <a:t>Não saber quando uma sala de estudo se encontra disponível.</a:t>
-            </a:r>
-          </a:p>
-          <a:p>
-            <a:r>
-              <a:rPr lang="pt-PT" dirty="0"/>
-              <a:t>Dificuldade relacionada com reservar salas nos sites para esse efeito.</a:t>
-            </a:r>
-          </a:p>
-        </p:txBody>
-      </p:sp>
-      <p:sp>
-        <p:nvSpPr>
-          <p:cNvPr id="17" name="TextBox 16">
-            <a:extLst>
-              <a:ext uri="{FF2B5EF4-FFF2-40B4-BE49-F238E27FC236}">
-                <a16:creationId xmlns:a16="http://schemas.microsoft.com/office/drawing/2014/main" id="{4DE46A66-E355-28DA-9133-10834AB116D5}"/>
-              </a:ext>
-            </a:extLst>
-          </p:cNvPr>
-          <p:cNvSpPr txBox="1"/>
-          <p:nvPr/>
-        </p:nvSpPr>
-        <p:spPr>
-          <a:xfrm>
-            <a:off x="3981217" y="3729262"/>
-            <a:ext cx="5947794" cy="646331"/>
-          </a:xfrm>
-          <a:prstGeom prst="rect">
-            <a:avLst/>
-          </a:prstGeom>
-          <a:noFill/>
-        </p:spPr>
-        <p:txBody>
-          <a:bodyPr wrap="square" rtlCol="0">
-            <a:spAutoFit/>
-          </a:bodyPr>
-          <a:lstStyle/>
-          <a:p>
-            <a:r>
-              <a:rPr lang="pt-PT" dirty="0"/>
-              <a:t>Reservar de uma forma mais intuitiva uma sala para ir estudar com o seu grupo de amigos.</a:t>
+            <a:pPr marL="285750" indent="-285750" algn="just">
+              <a:buFont typeface="Arial" panose="020B0604020202020204" pitchFamily="34" charset="0"/>
+              <a:buChar char="•"/>
+            </a:pPr>
+            <a:r>
+              <a:rPr lang="pt-PT" sz="1600" dirty="0"/>
+              <a:t>O Bruno gostaria de conhecer uma forma mais intuitiva de reservar uma sala para ir estudar com o seu grupo de amigos. </a:t>
+            </a:r>
+          </a:p>
+          <a:p>
+            <a:pPr marL="285750" indent="-285750" algn="just">
+              <a:buFont typeface="Arial" panose="020B0604020202020204" pitchFamily="34" charset="0"/>
+              <a:buChar char="•"/>
+            </a:pPr>
+            <a:r>
+              <a:rPr lang="pt-PT" sz="1600" dirty="0"/>
+              <a:t>No caso de as salas de estudo não estarem disponíveis, ele gostaria de saber quando irão estar e qual é a lotação da biblioteca naquele momento.</a:t>
+            </a:r>
+          </a:p>
+          <a:p>
+            <a:pPr marL="285750" indent="-285750" algn="just">
+              <a:buFont typeface="Arial" panose="020B0604020202020204" pitchFamily="34" charset="0"/>
+              <a:buChar char="•"/>
+            </a:pPr>
+            <a:r>
+              <a:rPr lang="pt-PT" sz="1600" dirty="0"/>
+              <a:t>Ele está interessado em ter um perfil da biblioteca e pedir amizade a outros colegas com o objetivo de encontrar pessoas competentes que o possam ajudar no estudo.</a:t>
             </a:r>
           </a:p>
         </p:txBody>

</xml_diff>